<commit_message>
Update 2 - Types of ML/Types of ML.pptx
</commit_message>
<xml_diff>
--- a/2 - Types of ML/Types of ML.pptx
+++ b/2 - Types of ML/Types of ML.pptx
@@ -5,7 +5,7 @@
     <p:sldMasterId id="2147483690" r:id="rId1"/>
   </p:sldMasterIdLst>
   <p:notesMasterIdLst>
-    <p:notesMasterId r:id="rId14"/>
+    <p:notesMasterId r:id="rId15"/>
   </p:notesMasterIdLst>
   <p:sldIdLst>
     <p:sldId id="256" r:id="rId2"/>
@@ -18,8 +18,9 @@
     <p:sldId id="302" r:id="rId9"/>
     <p:sldId id="303" r:id="rId10"/>
     <p:sldId id="304" r:id="rId11"/>
-    <p:sldId id="306" r:id="rId12"/>
-    <p:sldId id="307" r:id="rId13"/>
+    <p:sldId id="308" r:id="rId12"/>
+    <p:sldId id="306" r:id="rId13"/>
+    <p:sldId id="307" r:id="rId14"/>
   </p:sldIdLst>
   <p:sldSz cx="12192000" cy="6858000"/>
   <p:notesSz cx="6858000" cy="9144000"/>
@@ -4649,6 +4650,200 @@
           <p:cNvPr id="2" name="Title 1">
             <a:extLst>
               <a:ext uri="{FF2B5EF4-FFF2-40B4-BE49-F238E27FC236}">
+                <a16:creationId xmlns:a16="http://schemas.microsoft.com/office/drawing/2014/main" id="{45655251-B8E5-4B4D-82DE-183D4176FD9A}"/>
+              </a:ext>
+            </a:extLst>
+          </p:cNvPr>
+          <p:cNvSpPr>
+            <a:spLocks noGrp="1"/>
+          </p:cNvSpPr>
+          <p:nvPr>
+            <p:ph type="title"/>
+          </p:nvPr>
+        </p:nvSpPr>
+        <p:spPr/>
+        <p:txBody>
+          <a:bodyPr/>
+          <a:lstStyle/>
+          <a:p>
+            <a:r>
+              <a:rPr lang="en-US" dirty="0"/>
+              <a:t>Classification Examples</a:t>
+            </a:r>
+          </a:p>
+        </p:txBody>
+      </p:sp>
+      <p:sp>
+        <p:nvSpPr>
+          <p:cNvPr id="3" name="Content Placeholder 2">
+            <a:extLst>
+              <a:ext uri="{FF2B5EF4-FFF2-40B4-BE49-F238E27FC236}">
+                <a16:creationId xmlns:a16="http://schemas.microsoft.com/office/drawing/2014/main" id="{955549FC-3939-488E-B8A6-0B3B6B49A0B0}"/>
+              </a:ext>
+            </a:extLst>
+          </p:cNvPr>
+          <p:cNvSpPr>
+            <a:spLocks noGrp="1"/>
+          </p:cNvSpPr>
+          <p:nvPr>
+            <p:ph idx="1"/>
+          </p:nvPr>
+        </p:nvSpPr>
+        <p:spPr>
+          <a:xfrm>
+            <a:off x="838200" y="1520825"/>
+            <a:ext cx="10515600" cy="4351338"/>
+          </a:xfrm>
+        </p:spPr>
+        <p:txBody>
+          <a:bodyPr/>
+          <a:lstStyle/>
+          <a:p>
+            <a:r>
+              <a:rPr lang="en-US" dirty="0"/>
+              <a:t>Predict if house in high or low crime area</a:t>
+            </a:r>
+          </a:p>
+          <a:p>
+            <a:r>
+              <a:rPr lang="en-US" dirty="0"/>
+              <a:t>Predict student future occupation</a:t>
+            </a:r>
+          </a:p>
+          <a:p>
+            <a:r>
+              <a:rPr lang="en-US" dirty="0"/>
+              <a:t>Given an x-ray, diagnose type of condition</a:t>
+            </a:r>
+          </a:p>
+          <a:p>
+            <a:r>
+              <a:rPr lang="en-US" dirty="0"/>
+              <a:t>Segment medical image according to tissue type </a:t>
+            </a:r>
+          </a:p>
+          <a:p>
+            <a:endParaRPr lang="en-US" dirty="0"/>
+          </a:p>
+        </p:txBody>
+      </p:sp>
+      <p:pic>
+        <p:nvPicPr>
+          <p:cNvPr id="1026" name="Picture 2" descr="http://niftyweb.cs.ucl.ac.uk/img/gif.png">
+            <a:extLst>
+              <a:ext uri="{FF2B5EF4-FFF2-40B4-BE49-F238E27FC236}">
+                <a16:creationId xmlns:a16="http://schemas.microsoft.com/office/drawing/2014/main" id="{3B48F7DA-FF96-4D1C-8C18-76D1A8B38056}"/>
+              </a:ext>
+            </a:extLst>
+          </p:cNvPr>
+          <p:cNvPicPr>
+            <a:picLocks noChangeAspect="1" noChangeArrowheads="1"/>
+          </p:cNvPicPr>
+          <p:nvPr/>
+        </p:nvPicPr>
+        <p:blipFill>
+          <a:blip r:embed="rId2">
+            <a:extLst>
+              <a:ext uri="{28A0092B-C50C-407E-A947-70E740481C1C}">
+                <a14:useLocalDpi xmlns:a14="http://schemas.microsoft.com/office/drawing/2010/main" val="0"/>
+              </a:ext>
+            </a:extLst>
+          </a:blip>
+          <a:srcRect/>
+          <a:stretch>
+            <a:fillRect/>
+          </a:stretch>
+        </p:blipFill>
+        <p:spPr bwMode="auto">
+          <a:xfrm>
+            <a:off x="3690850" y="3746371"/>
+            <a:ext cx="4575147" cy="2576875"/>
+          </a:xfrm>
+          <a:prstGeom prst="rect">
+            <a:avLst/>
+          </a:prstGeom>
+          <a:noFill/>
+          <a:extLst>
+            <a:ext uri="{909E8E84-426E-40DD-AFC4-6F175D3DCCD1}">
+              <a14:hiddenFill xmlns:a14="http://schemas.microsoft.com/office/drawing/2010/main">
+                <a:solidFill>
+                  <a:srgbClr val="FFFFFF"/>
+                </a:solidFill>
+              </a14:hiddenFill>
+            </a:ext>
+          </a:extLst>
+        </p:spPr>
+      </p:pic>
+      <p:sp>
+        <p:nvSpPr>
+          <p:cNvPr id="4" name="TextBox 3">
+            <a:extLst>
+              <a:ext uri="{FF2B5EF4-FFF2-40B4-BE49-F238E27FC236}">
+                <a16:creationId xmlns:a16="http://schemas.microsoft.com/office/drawing/2014/main" id="{1B6F912D-AE28-453F-A449-5C36A7215288}"/>
+              </a:ext>
+            </a:extLst>
+          </p:cNvPr>
+          <p:cNvSpPr txBox="1"/>
+          <p:nvPr/>
+        </p:nvSpPr>
+        <p:spPr>
+          <a:xfrm>
+            <a:off x="0" y="6611779"/>
+            <a:ext cx="2385589" cy="246221"/>
+          </a:xfrm>
+          <a:prstGeom prst="rect">
+            <a:avLst/>
+          </a:prstGeom>
+          <a:noFill/>
+        </p:spPr>
+        <p:txBody>
+          <a:bodyPr wrap="none" rtlCol="0">
+            <a:spAutoFit/>
+          </a:bodyPr>
+          <a:lstStyle/>
+          <a:p>
+            <a:r>
+              <a:rPr lang="en-US" sz="1000" dirty="0"/>
+              <a:t>Image credit: http://niftyweb.cs.ucl.ac.uk/</a:t>
+            </a:r>
+          </a:p>
+        </p:txBody>
+      </p:sp>
+    </p:spTree>
+    <p:extLst>
+      <p:ext uri="{BB962C8B-B14F-4D97-AF65-F5344CB8AC3E}">
+        <p14:creationId xmlns:p14="http://schemas.microsoft.com/office/powerpoint/2010/main" val="2997529684"/>
+      </p:ext>
+    </p:extLst>
+  </p:cSld>
+  <p:clrMapOvr>
+    <a:masterClrMapping/>
+  </p:clrMapOvr>
+</p:sld>
+</file>
+
+<file path=ppt/slides/slide12.xml><?xml version="1.0" encoding="utf-8"?>
+<p:sld xmlns:a="http://schemas.openxmlformats.org/drawingml/2006/main" xmlns:r="http://schemas.openxmlformats.org/officeDocument/2006/relationships" xmlns:p="http://schemas.openxmlformats.org/presentationml/2006/main">
+  <p:cSld>
+    <p:spTree>
+      <p:nvGrpSpPr>
+        <p:cNvPr id="1" name=""/>
+        <p:cNvGrpSpPr/>
+        <p:nvPr/>
+      </p:nvGrpSpPr>
+      <p:grpSpPr>
+        <a:xfrm>
+          <a:off x="0" y="0"/>
+          <a:ext cx="0" cy="0"/>
+          <a:chOff x="0" y="0"/>
+          <a:chExt cx="0" cy="0"/>
+        </a:xfrm>
+      </p:grpSpPr>
+      <p:sp>
+        <p:nvSpPr>
+          <p:cNvPr id="2" name="Title 1">
+            <a:extLst>
+              <a:ext uri="{FF2B5EF4-FFF2-40B4-BE49-F238E27FC236}">
                 <a16:creationId xmlns:a16="http://schemas.microsoft.com/office/drawing/2014/main" id="{6AF747BF-CA00-42F6-B6D4-13061A37EDDA}"/>
               </a:ext>
             </a:extLst>
@@ -4875,7 +5070,7 @@
 </p:sld>
 </file>
 
-<file path=ppt/slides/slide12.xml><?xml version="1.0" encoding="utf-8"?>
+<file path=ppt/slides/slide13.xml><?xml version="1.0" encoding="utf-8"?>
 <p:sld xmlns:a="http://schemas.openxmlformats.org/drawingml/2006/main" xmlns:r="http://schemas.openxmlformats.org/officeDocument/2006/relationships" xmlns:p="http://schemas.openxmlformats.org/presentationml/2006/main">
   <p:cSld>
     <p:spTree>
@@ -4970,32 +5165,45 @@
           </a:p>
           <a:p>
             <a:r>
-              <a:rPr lang="en-US" dirty="0"/>
+              <a:rPr lang="en-US" dirty="0">
+                <a:hlinkClick r:id="rId3"/>
+              </a:rPr>
               <a:t>Linear regression </a:t>
             </a:r>
             <a:r>
-              <a:rPr lang="en-US" dirty="0" err="1"/>
+              <a:rPr lang="en-US" dirty="0" err="1">
+                <a:hlinkClick r:id="rId3"/>
+              </a:rPr>
               <a:t>Colab</a:t>
             </a:r>
             <a:r>
-              <a:rPr lang="en-US"/>
+              <a:rPr lang="en-US" dirty="0">
+                <a:hlinkClick r:id="rId3"/>
+              </a:rPr>
               <a:t> example</a:t>
             </a:r>
             <a:endParaRPr lang="en-US" dirty="0"/>
           </a:p>
           <a:p>
             <a:r>
-              <a:rPr lang="en-US" dirty="0"/>
+              <a:rPr lang="en-US" dirty="0">
+                <a:hlinkClick r:id="rId4"/>
+              </a:rPr>
               <a:t>Classification </a:t>
             </a:r>
             <a:r>
-              <a:rPr lang="en-US" dirty="0" err="1"/>
+              <a:rPr lang="en-US" dirty="0" err="1">
+                <a:hlinkClick r:id="rId4"/>
+              </a:rPr>
               <a:t>Colab</a:t>
             </a:r>
             <a:r>
-              <a:rPr lang="en-US" dirty="0"/>
+              <a:rPr lang="en-US" dirty="0">
+                <a:hlinkClick r:id="rId4"/>
+              </a:rPr>
               <a:t> example</a:t>
             </a:r>
+            <a:endParaRPr lang="en-US" dirty="0"/>
           </a:p>
         </p:txBody>
       </p:sp>
@@ -5630,7 +5838,7 @@
         <p:spPr/>
         <p:txBody>
           <a:bodyPr>
-            <a:normAutofit lnSpcReduction="10000"/>
+            <a:normAutofit/>
           </a:bodyPr>
           <a:lstStyle/>
           <a:p>
@@ -5673,40 +5881,6 @@
             <a:r>
               <a:rPr lang="en-US" dirty="0"/>
               <a:t>-learn</a:t>
-            </a:r>
-          </a:p>
-          <a:p>
-            <a:r>
-              <a:rPr lang="en-US" dirty="0"/>
-              <a:t>Basic machine learning algorithms</a:t>
-            </a:r>
-          </a:p>
-          <a:p>
-            <a:pPr lvl="1"/>
-            <a:r>
-              <a:rPr lang="en-US" dirty="0"/>
-              <a:t>Supervised</a:t>
-            </a:r>
-          </a:p>
-          <a:p>
-            <a:pPr lvl="1"/>
-            <a:r>
-              <a:rPr lang="en-US" dirty="0"/>
-              <a:t>Unsupervised</a:t>
-            </a:r>
-          </a:p>
-          <a:p>
-            <a:pPr lvl="1"/>
-            <a:r>
-              <a:rPr lang="en-US" dirty="0"/>
-              <a:t>Self-supervised</a:t>
-            </a:r>
-          </a:p>
-          <a:p>
-            <a:pPr lvl="1"/>
-            <a:r>
-              <a:rPr lang="en-US" dirty="0"/>
-              <a:t>Reinforcement</a:t>
             </a:r>
           </a:p>
           <a:p>

</xml_diff>